<commit_message>
Update 2025 Actuarial Generative Context Engineering Made Simple.pptx
</commit_message>
<xml_diff>
--- a/2025 Actuarial Generative Context Engineering Made Simple.pptx
+++ b/2025 Actuarial Generative Context Engineering Made Simple.pptx
@@ -8,7 +8,7 @@
     <p:sldMasterId id="2147483690" r:id="rId4"/>
   </p:sldMasterIdLst>
   <p:notesMasterIdLst>
-    <p:notesMasterId r:id="rId19"/>
+    <p:notesMasterId r:id="rId20"/>
   </p:notesMasterIdLst>
   <p:sldIdLst>
     <p:sldId id="266" r:id="rId5"/>
@@ -24,7 +24,8 @@
     <p:sldId id="275" r:id="rId15"/>
     <p:sldId id="276" r:id="rId16"/>
     <p:sldId id="278" r:id="rId17"/>
-    <p:sldId id="279" r:id="rId18"/>
+    <p:sldId id="280" r:id="rId18"/>
+    <p:sldId id="279" r:id="rId19"/>
   </p:sldIdLst>
   <p:sldSz cx="12192000" cy="6858000"/>
   <p:notesSz cx="6858000" cy="9144000"/>
@@ -3402,7 +3403,7 @@
           <a:p>
             <a:fld id="{D5D434F4-C773-4974-B845-79544B7DA9C3}" type="datetimeFigureOut">
               <a:rPr lang="en-US" smtClean="0"/>
-              <a:t>12/6/2025</a:t>
+              <a:t>12/8/2025</a:t>
             </a:fld>
             <a:endParaRPr lang="en-US"/>
           </a:p>
@@ -4973,7 +4974,7 @@
           <a:p>
             <a:fld id="{D6BE4793-EB6E-4246-9E7B-350CE75312EA}" type="datetimeFigureOut">
               <a:rPr lang="en-US" smtClean="0"/>
-              <a:t>12/6/2025</a:t>
+              <a:t>12/8/2025</a:t>
             </a:fld>
             <a:endParaRPr lang="en-US"/>
           </a:p>
@@ -5327,7 +5328,7 @@
           <a:p>
             <a:fld id="{D6BE4793-EB6E-4246-9E7B-350CE75312EA}" type="datetimeFigureOut">
               <a:rPr lang="en-US" smtClean="0"/>
-              <a:t>12/6/2025</a:t>
+              <a:t>12/8/2025</a:t>
             </a:fld>
             <a:endParaRPr lang="en-US"/>
           </a:p>
@@ -5635,7 +5636,7 @@
           <a:p>
             <a:fld id="{D6BE4793-EB6E-4246-9E7B-350CE75312EA}" type="datetimeFigureOut">
               <a:rPr lang="en-US" smtClean="0"/>
-              <a:t>12/6/2025</a:t>
+              <a:t>12/8/2025</a:t>
             </a:fld>
             <a:endParaRPr lang="en-US"/>
           </a:p>
@@ -6236,7 +6237,7 @@
           <a:p>
             <a:fld id="{D6BE4793-EB6E-4246-9E7B-350CE75312EA}" type="datetimeFigureOut">
               <a:rPr lang="en-US" smtClean="0"/>
-              <a:t>12/6/2025</a:t>
+              <a:t>12/8/2025</a:t>
             </a:fld>
             <a:endParaRPr lang="en-US"/>
           </a:p>
@@ -6544,7 +6545,7 @@
           <a:p>
             <a:fld id="{D6BE4793-EB6E-4246-9E7B-350CE75312EA}" type="datetimeFigureOut">
               <a:rPr lang="en-US" smtClean="0"/>
-              <a:t>12/6/2025</a:t>
+              <a:t>12/8/2025</a:t>
             </a:fld>
             <a:endParaRPr lang="en-US"/>
           </a:p>
@@ -7139,7 +7140,7 @@
           <a:p>
             <a:fld id="{D6BE4793-EB6E-4246-9E7B-350CE75312EA}" type="datetimeFigureOut">
               <a:rPr lang="en-US" smtClean="0"/>
-              <a:t>12/6/2025</a:t>
+              <a:t>12/8/2025</a:t>
             </a:fld>
             <a:endParaRPr lang="en-US"/>
           </a:p>
@@ -7499,7 +7500,7 @@
           <a:p>
             <a:fld id="{D6BE4793-EB6E-4246-9E7B-350CE75312EA}" type="datetimeFigureOut">
               <a:rPr lang="en-US" smtClean="0"/>
-              <a:t>12/6/2025</a:t>
+              <a:t>12/8/2025</a:t>
             </a:fld>
             <a:endParaRPr lang="en-US"/>
           </a:p>
@@ -7708,7 +7709,7 @@
           <a:p>
             <a:fld id="{D6BE4793-EB6E-4246-9E7B-350CE75312EA}" type="datetimeFigureOut">
               <a:rPr lang="en-US" smtClean="0"/>
-              <a:t>12/6/2025</a:t>
+              <a:t>12/8/2025</a:t>
             </a:fld>
             <a:endParaRPr lang="en-US"/>
           </a:p>
@@ -7979,7 +7980,7 @@
           <a:p>
             <a:fld id="{D6BE4793-EB6E-4246-9E7B-350CE75312EA}" type="datetimeFigureOut">
               <a:rPr lang="en-US" smtClean="0"/>
-              <a:t>12/6/2025</a:t>
+              <a:t>12/8/2025</a:t>
             </a:fld>
             <a:endParaRPr lang="en-US"/>
           </a:p>
@@ -8203,7 +8204,7 @@
           <a:p>
             <a:fld id="{5576DD97-36ED-4148-BB6C-15581984C544}" type="datetimeFigureOut">
               <a:rPr lang="en-US" smtClean="0"/>
-              <a:t>12/6/2025</a:t>
+              <a:t>12/8/2025</a:t>
             </a:fld>
             <a:endParaRPr lang="en-US"/>
           </a:p>
@@ -8517,7 +8518,7 @@
           <a:p>
             <a:fld id="{D6BE4793-EB6E-4246-9E7B-350CE75312EA}" type="datetimeFigureOut">
               <a:rPr lang="en-US" smtClean="0"/>
-              <a:t>12/6/2025</a:t>
+              <a:t>12/8/2025</a:t>
             </a:fld>
             <a:endParaRPr lang="en-US"/>
           </a:p>
@@ -8719,7 +8720,7 @@
           <a:p>
             <a:fld id="{5576DD97-36ED-4148-BB6C-15581984C544}" type="datetimeFigureOut">
               <a:rPr lang="en-US" smtClean="0"/>
-              <a:t>12/6/2025</a:t>
+              <a:t>12/8/2025</a:t>
             </a:fld>
             <a:endParaRPr lang="en-US"/>
           </a:p>
@@ -8994,7 +8995,7 @@
           <a:p>
             <a:fld id="{5576DD97-36ED-4148-BB6C-15581984C544}" type="datetimeFigureOut">
               <a:rPr lang="en-US" smtClean="0"/>
-              <a:t>12/6/2025</a:t>
+              <a:t>12/8/2025</a:t>
             </a:fld>
             <a:endParaRPr lang="en-US"/>
           </a:p>
@@ -9259,7 +9260,7 @@
           <a:p>
             <a:fld id="{5576DD97-36ED-4148-BB6C-15581984C544}" type="datetimeFigureOut">
               <a:rPr lang="en-US" smtClean="0"/>
-              <a:t>12/6/2025</a:t>
+              <a:t>12/8/2025</a:t>
             </a:fld>
             <a:endParaRPr lang="en-US"/>
           </a:p>
@@ -9671,7 +9672,7 @@
           <a:p>
             <a:fld id="{5576DD97-36ED-4148-BB6C-15581984C544}" type="datetimeFigureOut">
               <a:rPr lang="en-US" smtClean="0"/>
-              <a:t>12/6/2025</a:t>
+              <a:t>12/8/2025</a:t>
             </a:fld>
             <a:endParaRPr lang="en-US"/>
           </a:p>
@@ -9812,7 +9813,7 @@
           <a:p>
             <a:fld id="{5576DD97-36ED-4148-BB6C-15581984C544}" type="datetimeFigureOut">
               <a:rPr lang="en-US" smtClean="0"/>
-              <a:t>12/6/2025</a:t>
+              <a:t>12/8/2025</a:t>
             </a:fld>
             <a:endParaRPr lang="en-US"/>
           </a:p>
@@ -9925,7 +9926,7 @@
           <a:p>
             <a:fld id="{5576DD97-36ED-4148-BB6C-15581984C544}" type="datetimeFigureOut">
               <a:rPr lang="en-US" smtClean="0"/>
-              <a:t>12/6/2025</a:t>
+              <a:t>12/8/2025</a:t>
             </a:fld>
             <a:endParaRPr lang="en-US"/>
           </a:p>
@@ -10236,7 +10237,7 @@
           <a:p>
             <a:fld id="{5576DD97-36ED-4148-BB6C-15581984C544}" type="datetimeFigureOut">
               <a:rPr lang="en-US" smtClean="0"/>
-              <a:t>12/6/2025</a:t>
+              <a:t>12/8/2025</a:t>
             </a:fld>
             <a:endParaRPr lang="en-US"/>
           </a:p>
@@ -10524,7 +10525,7 @@
           <a:p>
             <a:fld id="{5576DD97-36ED-4148-BB6C-15581984C544}" type="datetimeFigureOut">
               <a:rPr lang="en-US" smtClean="0"/>
-              <a:t>12/6/2025</a:t>
+              <a:t>12/8/2025</a:t>
             </a:fld>
             <a:endParaRPr lang="en-US"/>
           </a:p>
@@ -10722,7 +10723,7 @@
           <a:p>
             <a:fld id="{5576DD97-36ED-4148-BB6C-15581984C544}" type="datetimeFigureOut">
               <a:rPr lang="en-US" smtClean="0"/>
-              <a:t>12/6/2025</a:t>
+              <a:t>12/8/2025</a:t>
             </a:fld>
             <a:endParaRPr lang="en-US"/>
           </a:p>
@@ -10930,7 +10931,7 @@
           <a:p>
             <a:fld id="{5576DD97-36ED-4148-BB6C-15581984C544}" type="datetimeFigureOut">
               <a:rPr lang="en-US" smtClean="0"/>
-              <a:t>12/6/2025</a:t>
+              <a:t>12/8/2025</a:t>
             </a:fld>
             <a:endParaRPr lang="en-US"/>
           </a:p>
@@ -11166,7 +11167,7 @@
           <a:p>
             <a:fld id="{D6BE4793-EB6E-4246-9E7B-350CE75312EA}" type="datetimeFigureOut">
               <a:rPr lang="en-US" smtClean="0"/>
-              <a:t>12/6/2025</a:t>
+              <a:t>12/8/2025</a:t>
             </a:fld>
             <a:endParaRPr lang="en-US"/>
           </a:p>
@@ -11472,7 +11473,7 @@
           <a:p>
             <a:fld id="{D6BE4793-EB6E-4246-9E7B-350CE75312EA}" type="datetimeFigureOut">
               <a:rPr lang="en-US" smtClean="0"/>
-              <a:t>12/6/2025</a:t>
+              <a:t>12/8/2025</a:t>
             </a:fld>
             <a:endParaRPr lang="en-US"/>
           </a:p>
@@ -11776,7 +11777,7 @@
           <a:p>
             <a:fld id="{D6BE4793-EB6E-4246-9E7B-350CE75312EA}" type="datetimeFigureOut">
               <a:rPr lang="en-US" smtClean="0"/>
-              <a:t>12/6/2025</a:t>
+              <a:t>12/8/2025</a:t>
             </a:fld>
             <a:endParaRPr lang="en-US"/>
           </a:p>
@@ -12194,7 +12195,7 @@
           <a:p>
             <a:fld id="{D6BE4793-EB6E-4246-9E7B-350CE75312EA}" type="datetimeFigureOut">
               <a:rPr lang="en-US" smtClean="0"/>
-              <a:t>12/6/2025</a:t>
+              <a:t>12/8/2025</a:t>
             </a:fld>
             <a:endParaRPr lang="en-US"/>
           </a:p>
@@ -12374,7 +12375,7 @@
           <a:p>
             <a:fld id="{D6BE4793-EB6E-4246-9E7B-350CE75312EA}" type="datetimeFigureOut">
               <a:rPr lang="en-US" smtClean="0"/>
-              <a:t>12/6/2025</a:t>
+              <a:t>12/8/2025</a:t>
             </a:fld>
             <a:endParaRPr lang="en-US"/>
           </a:p>
@@ -12623,7 +12624,7 @@
           <a:p>
             <a:fld id="{D6BE4793-EB6E-4246-9E7B-350CE75312EA}" type="datetimeFigureOut">
               <a:rPr lang="en-US" smtClean="0"/>
-              <a:t>12/6/2025</a:t>
+              <a:t>12/8/2025</a:t>
             </a:fld>
             <a:endParaRPr lang="en-US"/>
           </a:p>
@@ -13041,7 +13042,7 @@
           <a:p>
             <a:fld id="{D6BE4793-EB6E-4246-9E7B-350CE75312EA}" type="datetimeFigureOut">
               <a:rPr lang="en-US" smtClean="0"/>
-              <a:t>12/6/2025</a:t>
+              <a:t>12/8/2025</a:t>
             </a:fld>
             <a:endParaRPr lang="en-US"/>
           </a:p>
@@ -14773,7 +14774,7 @@
           <a:p>
             <a:fld id="{5576DD97-36ED-4148-BB6C-15581984C544}" type="datetimeFigureOut">
               <a:rPr lang="en-US" smtClean="0"/>
-              <a:t>12/6/2025</a:t>
+              <a:t>12/8/2025</a:t>
             </a:fld>
             <a:endParaRPr lang="en-US"/>
           </a:p>
@@ -17945,6 +17946,378 @@
 </file>
 
 <file path=ppt/slides/slide14.xml><?xml version="1.0" encoding="utf-8"?>
+<p:sld xmlns:a="http://schemas.openxmlformats.org/drawingml/2006/main" xmlns:r="http://schemas.openxmlformats.org/officeDocument/2006/relationships" xmlns:p="http://schemas.openxmlformats.org/presentationml/2006/main">
+  <p:cSld>
+    <p:spTree>
+      <p:nvGrpSpPr>
+        <p:cNvPr id="1" name="">
+          <a:extLst>
+            <a:ext uri="{FF2B5EF4-FFF2-40B4-BE49-F238E27FC236}">
+              <a16:creationId xmlns:a16="http://schemas.microsoft.com/office/drawing/2014/main" id="{6F65F772-E140-790D-6F8C-157223C46ECA}"/>
+            </a:ext>
+          </a:extLst>
+        </p:cNvPr>
+        <p:cNvGrpSpPr/>
+        <p:nvPr/>
+      </p:nvGrpSpPr>
+      <p:grpSpPr>
+        <a:xfrm>
+          <a:off x="0" y="0"/>
+          <a:ext cx="0" cy="0"/>
+          <a:chOff x="0" y="0"/>
+          <a:chExt cx="0" cy="0"/>
+        </a:xfrm>
+      </p:grpSpPr>
+      <p:sp>
+        <p:nvSpPr>
+          <p:cNvPr id="2" name="Title 1">
+            <a:extLst>
+              <a:ext uri="{FF2B5EF4-FFF2-40B4-BE49-F238E27FC236}">
+                <a16:creationId xmlns:a16="http://schemas.microsoft.com/office/drawing/2014/main" id="{26F4CF30-6F98-BFA0-E6D1-64D9685AF8C2}"/>
+              </a:ext>
+            </a:extLst>
+          </p:cNvPr>
+          <p:cNvSpPr>
+            <a:spLocks noGrp="1"/>
+          </p:cNvSpPr>
+          <p:nvPr>
+            <p:ph type="title"/>
+          </p:nvPr>
+        </p:nvSpPr>
+        <p:spPr>
+          <a:xfrm>
+            <a:off x="1250623" y="642769"/>
+            <a:ext cx="9690754" cy="871193"/>
+          </a:xfrm>
+        </p:spPr>
+        <p:txBody>
+          <a:bodyPr>
+            <a:noAutofit/>
+          </a:bodyPr>
+          <a:lstStyle/>
+          <a:p>
+            <a:pPr algn="ctr"/>
+            <a:r>
+              <a:rPr lang="en-US" sz="5400" b="1" cap="none" dirty="0">
+                <a:solidFill>
+                  <a:srgbClr val="92D050"/>
+                </a:solidFill>
+                <a:latin typeface="+mn-lt"/>
+              </a:rPr>
+              <a:t>CRVM Demo Calculator</a:t>
+            </a:r>
+          </a:p>
+        </p:txBody>
+      </p:sp>
+      <p:sp>
+        <p:nvSpPr>
+          <p:cNvPr id="3" name="TextBox 2">
+            <a:extLst>
+              <a:ext uri="{FF2B5EF4-FFF2-40B4-BE49-F238E27FC236}">
+                <a16:creationId xmlns:a16="http://schemas.microsoft.com/office/drawing/2014/main" id="{BBF2D7AA-013F-DA41-9624-CE21F901DD74}"/>
+              </a:ext>
+            </a:extLst>
+          </p:cNvPr>
+          <p:cNvSpPr txBox="1"/>
+          <p:nvPr/>
+        </p:nvSpPr>
+        <p:spPr>
+          <a:xfrm>
+            <a:off x="2969443" y="3120272"/>
+            <a:ext cx="2516957" cy="1456267"/>
+          </a:xfrm>
+          <a:prstGeom prst="rect">
+            <a:avLst/>
+          </a:prstGeom>
+          <a:noFill/>
+        </p:spPr>
+        <p:txBody>
+          <a:bodyPr wrap="square" rtlCol="0">
+            <a:spAutoFit/>
+          </a:bodyPr>
+          <a:lstStyle/>
+          <a:p>
+            <a:endParaRPr lang="en-US"/>
+          </a:p>
+        </p:txBody>
+      </p:sp>
+      <p:pic>
+        <p:nvPicPr>
+          <p:cNvPr id="5" name="Picture 4">
+            <a:extLst>
+              <a:ext uri="{FF2B5EF4-FFF2-40B4-BE49-F238E27FC236}">
+                <a16:creationId xmlns:a16="http://schemas.microsoft.com/office/drawing/2014/main" id="{A8635D8F-0B96-60F7-3A6C-ABCCF46554A5}"/>
+              </a:ext>
+            </a:extLst>
+          </p:cNvPr>
+          <p:cNvPicPr>
+            <a:picLocks noChangeAspect="1"/>
+          </p:cNvPicPr>
+          <p:nvPr/>
+        </p:nvPicPr>
+        <p:blipFill>
+          <a:blip r:embed="rId2"/>
+          <a:stretch>
+            <a:fillRect/>
+          </a:stretch>
+        </p:blipFill>
+        <p:spPr>
+          <a:xfrm>
+            <a:off x="4686103" y="1709114"/>
+            <a:ext cx="2819794" cy="2867425"/>
+          </a:xfrm>
+          <a:prstGeom prst="rect">
+            <a:avLst/>
+          </a:prstGeom>
+        </p:spPr>
+      </p:pic>
+      <p:sp>
+        <p:nvSpPr>
+          <p:cNvPr id="6" name="Title 1">
+            <a:extLst>
+              <a:ext uri="{FF2B5EF4-FFF2-40B4-BE49-F238E27FC236}">
+                <a16:creationId xmlns:a16="http://schemas.microsoft.com/office/drawing/2014/main" id="{8306BBAB-9E38-2116-23D6-3DDE08709310}"/>
+              </a:ext>
+            </a:extLst>
+          </p:cNvPr>
+          <p:cNvSpPr txBox="1">
+            <a:spLocks/>
+          </p:cNvSpPr>
+          <p:nvPr/>
+        </p:nvSpPr>
+        <p:spPr>
+          <a:xfrm>
+            <a:off x="1250623" y="4576539"/>
+            <a:ext cx="9690754" cy="871193"/>
+          </a:xfrm>
+          <a:prstGeom prst="rect">
+            <a:avLst/>
+          </a:prstGeom>
+          <a:effectLst/>
+        </p:spPr>
+        <p:txBody>
+          <a:bodyPr vert="horz" lIns="91440" tIns="45720" rIns="91440" bIns="45720" rtlCol="0" anchor="ctr">
+            <a:noAutofit/>
+          </a:bodyPr>
+          <a:lstStyle>
+            <a:lvl1pPr algn="l" defTabSz="457200" rtl="0" eaLnBrk="1" latinLnBrk="0" hangingPunct="1">
+              <a:spcBef>
+                <a:spcPct val="0"/>
+              </a:spcBef>
+              <a:buNone/>
+              <a:defRPr sz="3600" kern="1200" cap="all">
+                <a:ln w="3175" cmpd="sng">
+                  <a:noFill/>
+                </a:ln>
+                <a:solidFill>
+                  <a:schemeClr val="tx1"/>
+                </a:solidFill>
+                <a:effectLst/>
+                <a:latin typeface="+mj-lt"/>
+                <a:ea typeface="+mj-ea"/>
+                <a:cs typeface="+mj-cs"/>
+              </a:defRPr>
+            </a:lvl1pPr>
+            <a:lvl2pPr eaLnBrk="1" hangingPunct="1">
+              <a:defRPr>
+                <a:solidFill>
+                  <a:schemeClr val="tx2"/>
+                </a:solidFill>
+              </a:defRPr>
+            </a:lvl2pPr>
+            <a:lvl3pPr eaLnBrk="1" hangingPunct="1">
+              <a:defRPr>
+                <a:solidFill>
+                  <a:schemeClr val="tx2"/>
+                </a:solidFill>
+              </a:defRPr>
+            </a:lvl3pPr>
+            <a:lvl4pPr eaLnBrk="1" hangingPunct="1">
+              <a:defRPr>
+                <a:solidFill>
+                  <a:schemeClr val="tx2"/>
+                </a:solidFill>
+              </a:defRPr>
+            </a:lvl4pPr>
+            <a:lvl5pPr eaLnBrk="1" hangingPunct="1">
+              <a:defRPr>
+                <a:solidFill>
+                  <a:schemeClr val="tx2"/>
+                </a:solidFill>
+              </a:defRPr>
+            </a:lvl5pPr>
+            <a:lvl6pPr eaLnBrk="1" hangingPunct="1">
+              <a:defRPr>
+                <a:solidFill>
+                  <a:schemeClr val="tx2"/>
+                </a:solidFill>
+              </a:defRPr>
+            </a:lvl6pPr>
+            <a:lvl7pPr eaLnBrk="1" hangingPunct="1">
+              <a:defRPr>
+                <a:solidFill>
+                  <a:schemeClr val="tx2"/>
+                </a:solidFill>
+              </a:defRPr>
+            </a:lvl7pPr>
+            <a:lvl8pPr eaLnBrk="1" hangingPunct="1">
+              <a:defRPr>
+                <a:solidFill>
+                  <a:schemeClr val="tx2"/>
+                </a:solidFill>
+              </a:defRPr>
+            </a:lvl8pPr>
+            <a:lvl9pPr eaLnBrk="1" hangingPunct="1">
+              <a:defRPr>
+                <a:solidFill>
+                  <a:schemeClr val="tx2"/>
+                </a:solidFill>
+              </a:defRPr>
+            </a:lvl9pPr>
+          </a:lstStyle>
+          <a:p>
+            <a:pPr algn="ctr"/>
+            <a:endParaRPr lang="en-US" sz="4800" b="1" cap="none" dirty="0">
+              <a:solidFill>
+                <a:srgbClr val="92D050"/>
+              </a:solidFill>
+              <a:latin typeface="+mn-lt"/>
+            </a:endParaRPr>
+          </a:p>
+        </p:txBody>
+      </p:sp>
+      <p:sp>
+        <p:nvSpPr>
+          <p:cNvPr id="7" name="Title 1">
+            <a:extLst>
+              <a:ext uri="{FF2B5EF4-FFF2-40B4-BE49-F238E27FC236}">
+                <a16:creationId xmlns:a16="http://schemas.microsoft.com/office/drawing/2014/main" id="{723995F3-AAE9-1236-2DBB-C0251E45EF06}"/>
+              </a:ext>
+            </a:extLst>
+          </p:cNvPr>
+          <p:cNvSpPr txBox="1">
+            <a:spLocks/>
+          </p:cNvSpPr>
+          <p:nvPr/>
+        </p:nvSpPr>
+        <p:spPr>
+          <a:xfrm>
+            <a:off x="1250623" y="4771691"/>
+            <a:ext cx="9690754" cy="871193"/>
+          </a:xfrm>
+          <a:prstGeom prst="rect">
+            <a:avLst/>
+          </a:prstGeom>
+          <a:effectLst/>
+        </p:spPr>
+        <p:txBody>
+          <a:bodyPr vert="horz" lIns="91440" tIns="45720" rIns="91440" bIns="45720" rtlCol="0" anchor="ctr">
+            <a:noAutofit/>
+          </a:bodyPr>
+          <a:lstStyle>
+            <a:lvl1pPr algn="l" defTabSz="457200" rtl="0" eaLnBrk="1" latinLnBrk="0" hangingPunct="1">
+              <a:spcBef>
+                <a:spcPct val="0"/>
+              </a:spcBef>
+              <a:buNone/>
+              <a:defRPr sz="3600" kern="1200" cap="all">
+                <a:ln w="3175" cmpd="sng">
+                  <a:noFill/>
+                </a:ln>
+                <a:solidFill>
+                  <a:schemeClr val="tx1"/>
+                </a:solidFill>
+                <a:effectLst/>
+                <a:latin typeface="+mj-lt"/>
+                <a:ea typeface="+mj-ea"/>
+                <a:cs typeface="+mj-cs"/>
+              </a:defRPr>
+            </a:lvl1pPr>
+            <a:lvl2pPr eaLnBrk="1" hangingPunct="1">
+              <a:defRPr>
+                <a:solidFill>
+                  <a:schemeClr val="tx2"/>
+                </a:solidFill>
+              </a:defRPr>
+            </a:lvl2pPr>
+            <a:lvl3pPr eaLnBrk="1" hangingPunct="1">
+              <a:defRPr>
+                <a:solidFill>
+                  <a:schemeClr val="tx2"/>
+                </a:solidFill>
+              </a:defRPr>
+            </a:lvl3pPr>
+            <a:lvl4pPr eaLnBrk="1" hangingPunct="1">
+              <a:defRPr>
+                <a:solidFill>
+                  <a:schemeClr val="tx2"/>
+                </a:solidFill>
+              </a:defRPr>
+            </a:lvl4pPr>
+            <a:lvl5pPr eaLnBrk="1" hangingPunct="1">
+              <a:defRPr>
+                <a:solidFill>
+                  <a:schemeClr val="tx2"/>
+                </a:solidFill>
+              </a:defRPr>
+            </a:lvl5pPr>
+            <a:lvl6pPr eaLnBrk="1" hangingPunct="1">
+              <a:defRPr>
+                <a:solidFill>
+                  <a:schemeClr val="tx2"/>
+                </a:solidFill>
+              </a:defRPr>
+            </a:lvl6pPr>
+            <a:lvl7pPr eaLnBrk="1" hangingPunct="1">
+              <a:defRPr>
+                <a:solidFill>
+                  <a:schemeClr val="tx2"/>
+                </a:solidFill>
+              </a:defRPr>
+            </a:lvl7pPr>
+            <a:lvl8pPr eaLnBrk="1" hangingPunct="1">
+              <a:defRPr>
+                <a:solidFill>
+                  <a:schemeClr val="tx2"/>
+                </a:solidFill>
+              </a:defRPr>
+            </a:lvl8pPr>
+            <a:lvl9pPr eaLnBrk="1" hangingPunct="1">
+              <a:defRPr>
+                <a:solidFill>
+                  <a:schemeClr val="tx2"/>
+                </a:solidFill>
+              </a:defRPr>
+            </a:lvl9pPr>
+          </a:lstStyle>
+          <a:p>
+            <a:pPr algn="ctr"/>
+            <a:r>
+              <a:rPr lang="en-US" sz="2800" b="1" cap="none" dirty="0">
+                <a:solidFill>
+                  <a:srgbClr val="92D050"/>
+                </a:solidFill>
+                <a:latin typeface="+mn-lt"/>
+              </a:rPr>
+              <a:t>https://5thgenfinance.github.io/live/crvm-calculator/</a:t>
+            </a:r>
+          </a:p>
+        </p:txBody>
+      </p:sp>
+    </p:spTree>
+    <p:extLst>
+      <p:ext uri="{BB962C8B-B14F-4D97-AF65-F5344CB8AC3E}">
+        <p14:creationId xmlns:p14="http://schemas.microsoft.com/office/powerpoint/2010/main" val="4053659187"/>
+      </p:ext>
+    </p:extLst>
+  </p:cSld>
+  <p:clrMapOvr>
+    <a:masterClrMapping/>
+  </p:clrMapOvr>
+</p:sld>
+</file>
+
+<file path=ppt/slides/slide15.xml><?xml version="1.0" encoding="utf-8"?>
 <p:sld xmlns:a="http://schemas.openxmlformats.org/drawingml/2006/main" xmlns:r="http://schemas.openxmlformats.org/officeDocument/2006/relationships" xmlns:p="http://schemas.openxmlformats.org/presentationml/2006/main">
   <p:cSld>
     <p:spTree>

</xml_diff>